<commit_message>
updated presentation to reflect that it is on github!
</commit_message>
<xml_diff>
--- a/sony_lessons.pptx
+++ b/sony_lessons.pptx
@@ -532,11 +532,7 @@
             </a:r>
             <a:r>
               <a:rPr lang="en-US" baseline="0" dirty="0" smtClean="0"/>
-              <a:t> </a:t>
-            </a:r>
-            <a:r>
-              <a:rPr lang="en-US" baseline="0" dirty="0" smtClean="0"/>
-              <a:t>myself</a:t>
+              <a:t> myself</a:t>
             </a:r>
           </a:p>
           <a:p>
@@ -722,29 +718,8 @@
                 <a:ea typeface="+mn-ea"/>
                 <a:cs typeface="+mn-cs"/>
               </a:rPr>
-              <a:t>Script attack your own </a:t>
-            </a:r>
-            <a:r>
-              <a:rPr lang="en-US" sz="1200" kern="1200" dirty="0" smtClean="0">
-                <a:solidFill>
-                  <a:schemeClr val="tx1"/>
-                </a:solidFill>
-                <a:effectLst/>
-                <a:latin typeface="+mn-lt"/>
-                <a:ea typeface="+mn-ea"/>
-                <a:cs typeface="+mn-cs"/>
-              </a:rPr>
-              <a:t>stuff (Red teams)</a:t>
-            </a:r>
-            <a:endParaRPr lang="en-US" sz="1200" kern="1200" dirty="0" smtClean="0">
-              <a:solidFill>
-                <a:schemeClr val="tx1"/>
-              </a:solidFill>
-              <a:effectLst/>
-              <a:latin typeface="+mn-lt"/>
-              <a:ea typeface="+mn-ea"/>
-              <a:cs typeface="+mn-cs"/>
-            </a:endParaRPr>
+              <a:t>Script attack your own stuff (Red teams)</a:t>
+            </a:r>
           </a:p>
           <a:p>
             <a:r>
@@ -1375,15 +1350,6 @@
               </a:rPr>
               <a:t>?</a:t>
             </a:r>
-            <a:endParaRPr lang="en-US" sz="1200" kern="1200" dirty="0" smtClean="0">
-              <a:solidFill>
-                <a:schemeClr val="tx1"/>
-              </a:solidFill>
-              <a:effectLst/>
-              <a:latin typeface="+mn-lt"/>
-              <a:ea typeface="+mn-ea"/>
-              <a:cs typeface="+mn-cs"/>
-            </a:endParaRPr>
           </a:p>
         </p:txBody>
       </p:sp>
@@ -2131,11 +2097,29 @@
           <a:p>
             <a:r>
               <a:rPr lang="en-US" dirty="0" smtClean="0"/>
+              <a:t>Deck w/my notes on </a:t>
+            </a:r>
+            <a:r>
+              <a:rPr lang="en-US" dirty="0" err="1" smtClean="0"/>
+              <a:t>github</a:t>
+            </a:r>
+            <a:r>
+              <a:rPr lang="en-US" smtClean="0"/>
+              <a:t>!</a:t>
+            </a:r>
+          </a:p>
+          <a:p>
+            <a:r>
+              <a:rPr lang="en-US" dirty="0" smtClean="0"/>
               <a:t>Intro</a:t>
             </a:r>
             <a:r>
               <a:rPr lang="en-US" baseline="0" dirty="0" smtClean="0"/>
-              <a:t> myself</a:t>
+              <a:t> </a:t>
+            </a:r>
+            <a:r>
+              <a:rPr lang="en-US" baseline="0" dirty="0" smtClean="0"/>
+              <a:t>myself</a:t>
             </a:r>
           </a:p>
           <a:p>
@@ -2401,7 +2385,15 @@
           <a:p>
             <a:r>
               <a:rPr lang="en-US" dirty="0" smtClean="0"/>
-              <a:t>MSTS stuff</a:t>
+              <a:t>This presentation is available</a:t>
+            </a:r>
+            <a:r>
+              <a:rPr lang="en-US" baseline="0" dirty="0" smtClean="0"/>
+              <a:t> on </a:t>
+            </a:r>
+            <a:r>
+              <a:rPr lang="en-US" baseline="0" dirty="0" err="1" smtClean="0"/>
+              <a:t>github</a:t>
             </a:r>
             <a:endParaRPr lang="en-US" dirty="0"/>
           </a:p>
@@ -3069,11 +3061,7 @@
           <a:p>
             <a:r>
               <a:rPr lang="en-US" dirty="0" smtClean="0"/>
-              <a:t>Knowledgeable users will demand better security</a:t>
-            </a:r>
-            <a:r>
-              <a:rPr lang="en-US" dirty="0" smtClean="0"/>
-              <a:t>.</a:t>
+              <a:t>Knowledgeable users will demand better security.</a:t>
             </a:r>
           </a:p>
           <a:p>
@@ -3237,19 +3225,7 @@
                 <a:ea typeface="+mn-ea"/>
                 <a:cs typeface="+mn-cs"/>
               </a:rPr>
-              <a:t>You </a:t>
-            </a:r>
-            <a:r>
-              <a:rPr lang="en-US" sz="1200" kern="1200" dirty="0" smtClean="0">
-                <a:solidFill>
-                  <a:schemeClr val="tx1"/>
-                </a:solidFill>
-                <a:effectLst/>
-                <a:latin typeface="+mn-lt"/>
-                <a:ea typeface="+mn-ea"/>
-                <a:cs typeface="+mn-cs"/>
-              </a:rPr>
-              <a:t>need to take security seriously.  It will catch up with you.</a:t>
+              <a:t>You need to take security seriously.  It will catch up with you.</a:t>
             </a:r>
           </a:p>
           <a:p>
@@ -3356,8 +3332,11 @@
                 <a:ea typeface="+mn-ea"/>
                 <a:cs typeface="+mn-cs"/>
               </a:rPr>
-              <a:t>Why might they attack us?  What is their motivation</a:t>
-            </a:r>
+              <a:t>Why might they attack us?  What is their motivation?</a:t>
+            </a:r>
+          </a:p>
+          <a:p>
+            <a:pPr lvl="1"/>
             <a:r>
               <a:rPr lang="en-US" sz="1200" kern="1200" dirty="0" smtClean="0">
                 <a:solidFill>
@@ -3368,7 +3347,7 @@
                 <a:ea typeface="+mn-ea"/>
                 <a:cs typeface="+mn-cs"/>
               </a:rPr>
-              <a:t>?</a:t>
+              <a:t>	money?</a:t>
             </a:r>
           </a:p>
           <a:p>
@@ -3383,7 +3362,7 @@
                 <a:ea typeface="+mn-ea"/>
                 <a:cs typeface="+mn-cs"/>
               </a:rPr>
-              <a:t>	money?</a:t>
+              <a:t>	social agenda? (does your company do anything controversial?)</a:t>
             </a:r>
           </a:p>
           <a:p>
@@ -3398,17 +3377,8 @@
                 <a:ea typeface="+mn-ea"/>
                 <a:cs typeface="+mn-cs"/>
               </a:rPr>
-              <a:t>	social agenda? (does your company do anything controversial?)</a:t>
-            </a:r>
-            <a:endParaRPr lang="en-US" sz="1200" kern="1200" dirty="0" smtClean="0">
-              <a:solidFill>
-                <a:schemeClr val="tx1"/>
-              </a:solidFill>
-              <a:effectLst/>
-              <a:latin typeface="+mn-lt"/>
-              <a:ea typeface="+mn-ea"/>
-              <a:cs typeface="+mn-cs"/>
-            </a:endParaRPr>
+              <a:t>How much will it cost them to attack us?</a:t>
+            </a:r>
           </a:p>
           <a:p>
             <a:pPr lvl="1"/>
@@ -3422,7 +3392,7 @@
                 <a:ea typeface="+mn-ea"/>
                 <a:cs typeface="+mn-cs"/>
               </a:rPr>
-              <a:t>How much will it cost them to attack us?</a:t>
+              <a:t>How much will it cost us to fend them off?</a:t>
             </a:r>
           </a:p>
           <a:p>
@@ -3437,40 +3407,13 @@
                 <a:ea typeface="+mn-ea"/>
                 <a:cs typeface="+mn-cs"/>
               </a:rPr>
-              <a:t>How much will it cost us to fend them off?</a:t>
-            </a:r>
-          </a:p>
-          <a:p>
-            <a:pPr lvl="1"/>
-            <a:r>
-              <a:rPr lang="en-US" sz="1200" kern="1200" dirty="0" smtClean="0">
-                <a:solidFill>
-                  <a:schemeClr val="tx1"/>
-                </a:solidFill>
-                <a:effectLst/>
-                <a:latin typeface="+mn-lt"/>
-                <a:ea typeface="+mn-ea"/>
-                <a:cs typeface="+mn-cs"/>
-              </a:rPr>
               <a:t>How much will it cost for us to recover from an attack?</a:t>
             </a:r>
           </a:p>
           <a:p>
             <a:r>
               <a:rPr lang="en-US" dirty="0" smtClean="0"/>
-              <a:t>Product </a:t>
-            </a:r>
-            <a:r>
-              <a:rPr lang="en-US" dirty="0" smtClean="0"/>
-              <a:t>differentia </a:t>
-            </a:r>
-            <a:r>
-              <a:rPr lang="en-US" dirty="0" smtClean="0"/>
-              <a:t>– </a:t>
-            </a:r>
-            <a:r>
-              <a:rPr lang="en-US" dirty="0" smtClean="0"/>
-              <a:t>SalesForce.com</a:t>
+              <a:t>Product differentia – SalesForce.com</a:t>
             </a:r>
           </a:p>
           <a:p>
@@ -10872,10 +10815,15 @@
             <p:ph type="subTitle" idx="1"/>
           </p:nvPr>
         </p:nvSpPr>
-        <p:spPr/>
+        <p:spPr>
+          <a:xfrm>
+            <a:off x="3354442" y="3539864"/>
+            <a:ext cx="5114778" cy="1184536"/>
+          </a:xfrm>
+        </p:spPr>
         <p:txBody>
           <a:bodyPr>
-            <a:normAutofit lnSpcReduction="10000"/>
+            <a:normAutofit/>
           </a:bodyPr>
           <a:lstStyle/>
           <a:p>
@@ -10905,14 +10853,7 @@
                 <a:latin typeface="Consolas" pitchFamily="49" charset="0"/>
                 <a:cs typeface="Consolas" pitchFamily="49" charset="0"/>
               </a:rPr>
-              <a:t>@</a:t>
-            </a:r>
-            <a:r>
-              <a:rPr lang="en-US" dirty="0" smtClean="0">
-                <a:latin typeface="Consolas" pitchFamily="49" charset="0"/>
-                <a:cs typeface="Consolas" pitchFamily="49" charset="0"/>
-              </a:rPr>
-              <a:t>k0emt</a:t>
+              <a:t>@k0emt</a:t>
             </a:r>
             <a:endParaRPr lang="en-US" dirty="0">
               <a:latin typeface="Consolas" pitchFamily="49" charset="0"/>
@@ -12885,11 +12826,7 @@
           <a:p>
             <a:r>
               <a:rPr lang="en-US" dirty="0" smtClean="0"/>
-              <a:t>Impact on </a:t>
-            </a:r>
-            <a:r>
-              <a:rPr lang="en-US" dirty="0" smtClean="0"/>
-              <a:t>SONY</a:t>
+              <a:t>Impact on SONY</a:t>
             </a:r>
           </a:p>
           <a:p>
@@ -12897,7 +12834,6 @@
               <a:rPr lang="en-US" dirty="0" smtClean="0"/>
               <a:t>Impact on consumers</a:t>
             </a:r>
-            <a:endParaRPr lang="en-US" dirty="0" smtClean="0"/>
           </a:p>
           <a:p>
             <a:r>
@@ -12908,13 +12844,8 @@
           <a:p>
             <a:r>
               <a:rPr lang="en-US" dirty="0" smtClean="0"/>
-              <a:t>Impact on </a:t>
-            </a:r>
-            <a:r>
-              <a:rPr lang="en-US" dirty="0" smtClean="0"/>
-              <a:t>developers, etc.</a:t>
-            </a:r>
-            <a:endParaRPr lang="en-US" dirty="0" smtClean="0"/>
+              <a:t>Impact on developers, etc.</a:t>
+            </a:r>
           </a:p>
           <a:p>
             <a:r>
@@ -12925,15 +12856,7 @@
           <a:p>
             <a:r>
               <a:rPr lang="en-US" dirty="0" smtClean="0"/>
-              <a:t>Developer Practices (whirl </a:t>
-            </a:r>
-            <a:r>
-              <a:rPr lang="en-US" dirty="0" smtClean="0"/>
-              <a:t>wind</a:t>
-            </a:r>
-            <a:r>
-              <a:rPr lang="en-US" dirty="0" smtClean="0"/>
-              <a:t>)</a:t>
+              <a:t>Developer Practices (whirl wind)</a:t>
             </a:r>
           </a:p>
           <a:p>
@@ -12987,14 +12910,7 @@
                 <a:latin typeface="Consolas" pitchFamily="49" charset="0"/>
                 <a:cs typeface="Consolas" pitchFamily="49" charset="0"/>
               </a:rPr>
-              <a:t>@k0</a:t>
-            </a:r>
-            <a:r>
-              <a:rPr lang="en-US" b="1" dirty="0" smtClean="0">
-                <a:latin typeface="Consolas" pitchFamily="49" charset="0"/>
-                <a:cs typeface="Consolas" pitchFamily="49" charset="0"/>
-              </a:rPr>
-              <a:t>emt</a:t>
+              <a:t>@k0emt</a:t>
             </a:r>
             <a:endParaRPr lang="en-US" b="1" dirty="0">
               <a:latin typeface="Consolas" pitchFamily="49" charset="0"/>
@@ -13313,8 +13229,35 @@
                 <a:latin typeface="Consolas" pitchFamily="49" charset="0"/>
                 <a:cs typeface="Consolas" pitchFamily="49" charset="0"/>
               </a:rPr>
-              <a:t>Blog: soloso.blogspot.com</a:t>
-            </a:r>
+              <a:t>Blog: </a:t>
+            </a:r>
+            <a:r>
+              <a:rPr lang="en-US" dirty="0" smtClean="0">
+                <a:latin typeface="Consolas" pitchFamily="49" charset="0"/>
+                <a:cs typeface="Consolas" pitchFamily="49" charset="0"/>
+              </a:rPr>
+              <a:t>soloso.blogspot.com</a:t>
+            </a:r>
+          </a:p>
+          <a:p>
+            <a:r>
+              <a:rPr lang="en-US" dirty="0" err="1" smtClean="0">
+                <a:latin typeface="Consolas" pitchFamily="49" charset="0"/>
+                <a:cs typeface="Consolas" pitchFamily="49" charset="0"/>
+              </a:rPr>
+              <a:t>Github</a:t>
+            </a:r>
+            <a:r>
+              <a:rPr lang="en-US" dirty="0" smtClean="0">
+                <a:latin typeface="Consolas" pitchFamily="49" charset="0"/>
+                <a:cs typeface="Consolas" pitchFamily="49" charset="0"/>
+              </a:rPr>
+              <a:t>: k0emt</a:t>
+            </a:r>
+            <a:endParaRPr lang="en-US" dirty="0" smtClean="0">
+              <a:latin typeface="Consolas" pitchFamily="49" charset="0"/>
+              <a:cs typeface="Consolas" pitchFamily="49" charset="0"/>
+            </a:endParaRPr>
           </a:p>
         </p:txBody>
       </p:sp>
@@ -13536,11 +13479,7 @@
             </a:r>
             <a:r>
               <a:rPr lang="en-US" b="1" dirty="0" smtClean="0"/>
-              <a:t>consumers</a:t>
-            </a:r>
-            <a:r>
-              <a:rPr lang="en-US" b="1" dirty="0" smtClean="0"/>
-              <a:t>?</a:t>
+              <a:t>consumers?</a:t>
             </a:r>
           </a:p>
           <a:p>
@@ -14078,7 +14017,6 @@
               <a:rPr lang="en-US" b="1" dirty="0" smtClean="0"/>
               <a:t>?</a:t>
             </a:r>
-            <a:endParaRPr lang="en-US" b="1" dirty="0" smtClean="0"/>
           </a:p>
         </p:txBody>
       </p:sp>

</xml_diff>